<commit_message>
[FRAMEWORK] Implement base action executer
</commit_message>
<xml_diff>
--- a/Docs/SIRRC flow/[SIRRC-v0.1]CodeFlow.pptx
+++ b/Docs/SIRRC flow/[SIRRC-v0.1]CodeFlow.pptx
@@ -6,6 +6,7 @@
   </p:sldMasterIdLst>
   <p:sldIdLst>
     <p:sldId id="256" r:id="rId2"/>
+    <p:sldId id="257" r:id="rId3"/>
   </p:sldIdLst>
   <p:sldSz cx="12192000" cy="6858000"/>
   <p:notesSz cx="6858000" cy="9144000"/>
@@ -104,6 +105,11 @@
       </a:defRPr>
     </a:lvl9pPr>
   </p:defaultTextStyle>
+  <p:extLst>
+    <p:ext uri="{EFAFB233-063F-42B5-8137-9DF3F51BA10A}">
+      <p15:sldGuideLst xmlns:p15="http://schemas.microsoft.com/office/powerpoint/2012/main"/>
+    </p:ext>
+  </p:extLst>
 </p:presentation>
 </file>
 
@@ -238,7 +244,7 @@
           <a:p>
             <a:fld id="{8AFF9D57-A615-4B16-BACC-8741D78AEC68}" type="datetimeFigureOut">
               <a:rPr lang="en-US" smtClean="0"/>
-              <a:t>5/7/2021</a:t>
+              <a:t>5/9/2021</a:t>
             </a:fld>
             <a:endParaRPr lang="en-US"/>
           </a:p>
@@ -408,7 +414,7 @@
           <a:p>
             <a:fld id="{8AFF9D57-A615-4B16-BACC-8741D78AEC68}" type="datetimeFigureOut">
               <a:rPr lang="en-US" smtClean="0"/>
-              <a:t>5/7/2021</a:t>
+              <a:t>5/9/2021</a:t>
             </a:fld>
             <a:endParaRPr lang="en-US"/>
           </a:p>
@@ -588,7 +594,7 @@
           <a:p>
             <a:fld id="{8AFF9D57-A615-4B16-BACC-8741D78AEC68}" type="datetimeFigureOut">
               <a:rPr lang="en-US" smtClean="0"/>
-              <a:t>5/7/2021</a:t>
+              <a:t>5/9/2021</a:t>
             </a:fld>
             <a:endParaRPr lang="en-US"/>
           </a:p>
@@ -758,7 +764,7 @@
           <a:p>
             <a:fld id="{8AFF9D57-A615-4B16-BACC-8741D78AEC68}" type="datetimeFigureOut">
               <a:rPr lang="en-US" smtClean="0"/>
-              <a:t>5/7/2021</a:t>
+              <a:t>5/9/2021</a:t>
             </a:fld>
             <a:endParaRPr lang="en-US"/>
           </a:p>
@@ -1004,7 +1010,7 @@
           <a:p>
             <a:fld id="{8AFF9D57-A615-4B16-BACC-8741D78AEC68}" type="datetimeFigureOut">
               <a:rPr lang="en-US" smtClean="0"/>
-              <a:t>5/7/2021</a:t>
+              <a:t>5/9/2021</a:t>
             </a:fld>
             <a:endParaRPr lang="en-US"/>
           </a:p>
@@ -1236,7 +1242,7 @@
           <a:p>
             <a:fld id="{8AFF9D57-A615-4B16-BACC-8741D78AEC68}" type="datetimeFigureOut">
               <a:rPr lang="en-US" smtClean="0"/>
-              <a:t>5/7/2021</a:t>
+              <a:t>5/9/2021</a:t>
             </a:fld>
             <a:endParaRPr lang="en-US"/>
           </a:p>
@@ -1603,7 +1609,7 @@
           <a:p>
             <a:fld id="{8AFF9D57-A615-4B16-BACC-8741D78AEC68}" type="datetimeFigureOut">
               <a:rPr lang="en-US" smtClean="0"/>
-              <a:t>5/7/2021</a:t>
+              <a:t>5/9/2021</a:t>
             </a:fld>
             <a:endParaRPr lang="en-US"/>
           </a:p>
@@ -1721,7 +1727,7 @@
           <a:p>
             <a:fld id="{8AFF9D57-A615-4B16-BACC-8741D78AEC68}" type="datetimeFigureOut">
               <a:rPr lang="en-US" smtClean="0"/>
-              <a:t>5/7/2021</a:t>
+              <a:t>5/9/2021</a:t>
             </a:fld>
             <a:endParaRPr lang="en-US"/>
           </a:p>
@@ -1816,7 +1822,7 @@
           <a:p>
             <a:fld id="{8AFF9D57-A615-4B16-BACC-8741D78AEC68}" type="datetimeFigureOut">
               <a:rPr lang="en-US" smtClean="0"/>
-              <a:t>5/7/2021</a:t>
+              <a:t>5/9/2021</a:t>
             </a:fld>
             <a:endParaRPr lang="en-US"/>
           </a:p>
@@ -2093,7 +2099,7 @@
           <a:p>
             <a:fld id="{8AFF9D57-A615-4B16-BACC-8741D78AEC68}" type="datetimeFigureOut">
               <a:rPr lang="en-US" smtClean="0"/>
-              <a:t>5/7/2021</a:t>
+              <a:t>5/9/2021</a:t>
             </a:fld>
             <a:endParaRPr lang="en-US"/>
           </a:p>
@@ -2346,7 +2352,7 @@
           <a:p>
             <a:fld id="{8AFF9D57-A615-4B16-BACC-8741D78AEC68}" type="datetimeFigureOut">
               <a:rPr lang="en-US" smtClean="0"/>
-              <a:t>5/7/2021</a:t>
+              <a:t>5/9/2021</a:t>
             </a:fld>
             <a:endParaRPr lang="en-US"/>
           </a:p>
@@ -2559,7 +2565,7 @@
           <a:p>
             <a:fld id="{8AFF9D57-A615-4B16-BACC-8741D78AEC68}" type="datetimeFigureOut">
               <a:rPr lang="en-US" smtClean="0"/>
-              <a:t>5/7/2021</a:t>
+              <a:t>5/9/2021</a:t>
             </a:fld>
             <a:endParaRPr lang="en-US"/>
           </a:p>
@@ -5874,6 +5880,1064 @@
 </p:sld>
 </file>
 
+<file path=ppt/slides/slide2.xml><?xml version="1.0" encoding="utf-8"?>
+<p:sld xmlns:a="http://schemas.openxmlformats.org/drawingml/2006/main" xmlns:r="http://schemas.openxmlformats.org/officeDocument/2006/relationships" xmlns:p="http://schemas.openxmlformats.org/presentationml/2006/main">
+  <p:cSld>
+    <p:spTree>
+      <p:nvGrpSpPr>
+        <p:cNvPr id="1" name=""/>
+        <p:cNvGrpSpPr/>
+        <p:nvPr/>
+      </p:nvGrpSpPr>
+      <p:grpSpPr>
+        <a:xfrm>
+          <a:off x="0" y="0"/>
+          <a:ext cx="0" cy="0"/>
+          <a:chOff x="0" y="0"/>
+          <a:chExt cx="0" cy="0"/>
+        </a:xfrm>
+      </p:grpSpPr>
+      <p:grpSp>
+        <p:nvGrpSpPr>
+          <p:cNvPr id="28" name="Group 27"/>
+          <p:cNvGrpSpPr/>
+          <p:nvPr/>
+        </p:nvGrpSpPr>
+        <p:grpSpPr>
+          <a:xfrm>
+            <a:off x="2640621" y="561210"/>
+            <a:ext cx="9331871" cy="1319708"/>
+            <a:chOff x="169983" y="807395"/>
+            <a:chExt cx="9331871" cy="1319708"/>
+          </a:xfrm>
+        </p:grpSpPr>
+        <p:sp>
+          <p:nvSpPr>
+            <p:cNvPr id="3" name="Rounded Rectangle 2"/>
+            <p:cNvSpPr/>
+            <p:nvPr/>
+          </p:nvSpPr>
+          <p:spPr>
+            <a:xfrm>
+              <a:off x="169983" y="1321778"/>
+              <a:ext cx="1289539" cy="322384"/>
+            </a:xfrm>
+            <a:prstGeom prst="roundRect">
+              <a:avLst/>
+            </a:prstGeom>
+            <a:solidFill>
+              <a:schemeClr val="accent4">
+                <a:lumMod val="60000"/>
+                <a:lumOff val="40000"/>
+              </a:schemeClr>
+            </a:solidFill>
+            <a:ln>
+              <a:noFill/>
+            </a:ln>
+          </p:spPr>
+          <p:style>
+            <a:lnRef idx="2">
+              <a:schemeClr val="accent4">
+                <a:shade val="50000"/>
+              </a:schemeClr>
+            </a:lnRef>
+            <a:fillRef idx="1">
+              <a:schemeClr val="accent4"/>
+            </a:fillRef>
+            <a:effectRef idx="0">
+              <a:schemeClr val="accent4"/>
+            </a:effectRef>
+            <a:fontRef idx="minor">
+              <a:schemeClr val="lt1"/>
+            </a:fontRef>
+          </p:style>
+          <p:txBody>
+            <a:bodyPr rtlCol="0" anchor="ctr"/>
+            <a:lstStyle/>
+            <a:p>
+              <a:pPr algn="ctr"/>
+              <a:r>
+                <a:rPr lang="en-US" sz="1200" smtClean="0">
+                  <a:solidFill>
+                    <a:schemeClr val="tx1"/>
+                  </a:solidFill>
+                </a:rPr>
+                <a:t>IActionListener</a:t>
+              </a:r>
+            </a:p>
+          </p:txBody>
+        </p:sp>
+        <p:sp>
+          <p:nvSpPr>
+            <p:cNvPr id="4" name="Rounded Rectangle 3"/>
+            <p:cNvSpPr/>
+            <p:nvPr/>
+          </p:nvSpPr>
+          <p:spPr>
+            <a:xfrm>
+              <a:off x="2951284" y="823547"/>
+              <a:ext cx="1673471" cy="322384"/>
+            </a:xfrm>
+            <a:prstGeom prst="roundRect">
+              <a:avLst/>
+            </a:prstGeom>
+            <a:solidFill>
+              <a:schemeClr val="accent4">
+                <a:lumMod val="60000"/>
+                <a:lumOff val="40000"/>
+              </a:schemeClr>
+            </a:solidFill>
+            <a:ln>
+              <a:noFill/>
+            </a:ln>
+          </p:spPr>
+          <p:style>
+            <a:lnRef idx="2">
+              <a:schemeClr val="accent4">
+                <a:shade val="50000"/>
+              </a:schemeClr>
+            </a:lnRef>
+            <a:fillRef idx="1">
+              <a:schemeClr val="accent4"/>
+            </a:fillRef>
+            <a:effectRef idx="0">
+              <a:schemeClr val="accent4"/>
+            </a:effectRef>
+            <a:fontRef idx="minor">
+              <a:schemeClr val="lt1"/>
+            </a:fontRef>
+          </p:style>
+          <p:txBody>
+            <a:bodyPr rtlCol="0" anchor="ctr"/>
+            <a:lstStyle/>
+            <a:p>
+              <a:pPr algn="ctr"/>
+              <a:r>
+                <a:rPr lang="en-US" sz="1200" smtClean="0">
+                  <a:solidFill>
+                    <a:schemeClr val="tx1"/>
+                  </a:solidFill>
+                </a:rPr>
+                <a:t>IActionExecuteHelper</a:t>
+              </a:r>
+            </a:p>
+          </p:txBody>
+        </p:sp>
+        <p:sp>
+          <p:nvSpPr>
+            <p:cNvPr id="6" name="Rounded Rectangle 5"/>
+            <p:cNvSpPr/>
+            <p:nvPr/>
+          </p:nvSpPr>
+          <p:spPr>
+            <a:xfrm>
+              <a:off x="2951284" y="1776047"/>
+              <a:ext cx="1673471" cy="322384"/>
+            </a:xfrm>
+            <a:prstGeom prst="roundRect">
+              <a:avLst/>
+            </a:prstGeom>
+            <a:solidFill>
+              <a:schemeClr val="accent4">
+                <a:lumMod val="60000"/>
+                <a:lumOff val="40000"/>
+              </a:schemeClr>
+            </a:solidFill>
+            <a:ln>
+              <a:noFill/>
+            </a:ln>
+          </p:spPr>
+          <p:style>
+            <a:lnRef idx="2">
+              <a:schemeClr val="accent4">
+                <a:shade val="50000"/>
+              </a:schemeClr>
+            </a:lnRef>
+            <a:fillRef idx="1">
+              <a:schemeClr val="accent4"/>
+            </a:fillRef>
+            <a:effectRef idx="0">
+              <a:schemeClr val="accent4"/>
+            </a:effectRef>
+            <a:fontRef idx="minor">
+              <a:schemeClr val="lt1"/>
+            </a:fontRef>
+          </p:style>
+          <p:txBody>
+            <a:bodyPr rtlCol="0" anchor="ctr"/>
+            <a:lstStyle/>
+            <a:p>
+              <a:pPr algn="ctr"/>
+              <a:r>
+                <a:rPr lang="en-US" sz="1200" smtClean="0">
+                  <a:solidFill>
+                    <a:schemeClr val="tx1"/>
+                  </a:solidFill>
+                </a:rPr>
+                <a:t>IActionFactory</a:t>
+              </a:r>
+            </a:p>
+          </p:txBody>
+        </p:sp>
+        <p:sp>
+          <p:nvSpPr>
+            <p:cNvPr id="8" name="Oval 7"/>
+            <p:cNvSpPr/>
+            <p:nvPr/>
+          </p:nvSpPr>
+          <p:spPr>
+            <a:xfrm>
+              <a:off x="2208579" y="1459279"/>
+              <a:ext cx="45719" cy="45719"/>
+            </a:xfrm>
+            <a:prstGeom prst="ellipse">
+              <a:avLst/>
+            </a:prstGeom>
+            <a:ln>
+              <a:noFill/>
+            </a:ln>
+          </p:spPr>
+          <p:style>
+            <a:lnRef idx="2">
+              <a:schemeClr val="dk1">
+                <a:shade val="50000"/>
+              </a:schemeClr>
+            </a:lnRef>
+            <a:fillRef idx="1">
+              <a:schemeClr val="dk1"/>
+            </a:fillRef>
+            <a:effectRef idx="0">
+              <a:schemeClr val="dk1"/>
+            </a:effectRef>
+            <a:fontRef idx="minor">
+              <a:schemeClr val="lt1"/>
+            </a:fontRef>
+          </p:style>
+          <p:txBody>
+            <a:bodyPr rtlCol="0" anchor="ctr"/>
+            <a:lstStyle/>
+            <a:p>
+              <a:pPr algn="ctr"/>
+              <a:endParaRPr lang="en-US"/>
+            </a:p>
+          </p:txBody>
+        </p:sp>
+        <p:cxnSp>
+          <p:nvCxnSpPr>
+            <p:cNvPr id="10" name="Straight Connector 9"/>
+            <p:cNvCxnSpPr>
+              <a:stCxn id="3" idx="3"/>
+              <a:endCxn id="8" idx="2"/>
+            </p:cNvCxnSpPr>
+            <p:nvPr/>
+          </p:nvCxnSpPr>
+          <p:spPr>
+            <a:xfrm flipV="1">
+              <a:off x="1459522" y="1482139"/>
+              <a:ext cx="749057" cy="831"/>
+            </a:xfrm>
+            <a:prstGeom prst="line">
+              <a:avLst/>
+            </a:prstGeom>
+          </p:spPr>
+          <p:style>
+            <a:lnRef idx="1">
+              <a:schemeClr val="dk1"/>
+            </a:lnRef>
+            <a:fillRef idx="0">
+              <a:schemeClr val="dk1"/>
+            </a:fillRef>
+            <a:effectRef idx="0">
+              <a:schemeClr val="dk1"/>
+            </a:effectRef>
+            <a:fontRef idx="minor">
+              <a:schemeClr val="tx1"/>
+            </a:fontRef>
+          </p:style>
+        </p:cxnSp>
+        <p:sp>
+          <p:nvSpPr>
+            <p:cNvPr id="11" name="TextBox 10"/>
+            <p:cNvSpPr txBox="1"/>
+            <p:nvPr/>
+          </p:nvSpPr>
+          <p:spPr>
+            <a:xfrm>
+              <a:off x="1459522" y="1321778"/>
+              <a:ext cx="742511" cy="215444"/>
+            </a:xfrm>
+            <a:prstGeom prst="rect">
+              <a:avLst/>
+            </a:prstGeom>
+            <a:noFill/>
+          </p:spPr>
+          <p:txBody>
+            <a:bodyPr wrap="none" rtlCol="0">
+              <a:spAutoFit/>
+            </a:bodyPr>
+            <a:lstStyle/>
+            <a:p>
+              <a:r>
+                <a:rPr lang="en-US" sz="800" smtClean="0"/>
+                <a:t>Create action</a:t>
+              </a:r>
+              <a:endParaRPr lang="en-US" sz="800"/>
+            </a:p>
+          </p:txBody>
+        </p:sp>
+        <p:cxnSp>
+          <p:nvCxnSpPr>
+            <p:cNvPr id="13" name="Elbow Connector 12"/>
+            <p:cNvCxnSpPr>
+              <a:stCxn id="8" idx="5"/>
+              <a:endCxn id="6" idx="1"/>
+            </p:cNvCxnSpPr>
+            <p:nvPr/>
+          </p:nvCxnSpPr>
+          <p:spPr>
+            <a:xfrm rot="16200000" flipH="1">
+              <a:off x="2379975" y="1365930"/>
+              <a:ext cx="438936" cy="703681"/>
+            </a:xfrm>
+            <a:prstGeom prst="bentConnector2">
+              <a:avLst/>
+            </a:prstGeom>
+            <a:ln>
+              <a:tailEnd type="triangle"/>
+            </a:ln>
+          </p:spPr>
+          <p:style>
+            <a:lnRef idx="1">
+              <a:schemeClr val="dk1"/>
+            </a:lnRef>
+            <a:fillRef idx="0">
+              <a:schemeClr val="dk1"/>
+            </a:fillRef>
+            <a:effectRef idx="0">
+              <a:schemeClr val="dk1"/>
+            </a:effectRef>
+            <a:fontRef idx="minor">
+              <a:schemeClr val="tx1"/>
+            </a:fontRef>
+          </p:style>
+        </p:cxnSp>
+        <p:cxnSp>
+          <p:nvCxnSpPr>
+            <p:cNvPr id="15" name="Elbow Connector 14"/>
+            <p:cNvCxnSpPr>
+              <a:stCxn id="8" idx="7"/>
+              <a:endCxn id="4" idx="1"/>
+            </p:cNvCxnSpPr>
+            <p:nvPr/>
+          </p:nvCxnSpPr>
+          <p:spPr>
+            <a:xfrm rot="5400000" flipH="1" flipV="1">
+              <a:off x="2358826" y="873517"/>
+              <a:ext cx="481235" cy="703681"/>
+            </a:xfrm>
+            <a:prstGeom prst="bentConnector2">
+              <a:avLst/>
+            </a:prstGeom>
+            <a:ln>
+              <a:tailEnd type="triangle"/>
+            </a:ln>
+          </p:spPr>
+          <p:style>
+            <a:lnRef idx="1">
+              <a:schemeClr val="dk1"/>
+            </a:lnRef>
+            <a:fillRef idx="0">
+              <a:schemeClr val="dk1"/>
+            </a:fillRef>
+            <a:effectRef idx="0">
+              <a:schemeClr val="dk1"/>
+            </a:effectRef>
+            <a:fontRef idx="minor">
+              <a:schemeClr val="tx1"/>
+            </a:fontRef>
+          </p:style>
+        </p:cxnSp>
+        <p:sp>
+          <p:nvSpPr>
+            <p:cNvPr id="16" name="TextBox 15"/>
+            <p:cNvSpPr txBox="1"/>
+            <p:nvPr/>
+          </p:nvSpPr>
+          <p:spPr>
+            <a:xfrm>
+              <a:off x="2097258" y="1911659"/>
+              <a:ext cx="906017" cy="215444"/>
+            </a:xfrm>
+            <a:prstGeom prst="rect">
+              <a:avLst/>
+            </a:prstGeom>
+            <a:noFill/>
+          </p:spPr>
+          <p:txBody>
+            <a:bodyPr wrap="none" rtlCol="0">
+              <a:spAutoFit/>
+            </a:bodyPr>
+            <a:lstStyle/>
+            <a:p>
+              <a:r>
+                <a:rPr lang="en-US" sz="800" smtClean="0"/>
+                <a:t>If action not exist</a:t>
+              </a:r>
+              <a:endParaRPr lang="en-US" sz="800"/>
+            </a:p>
+          </p:txBody>
+        </p:sp>
+        <p:sp>
+          <p:nvSpPr>
+            <p:cNvPr id="17" name="TextBox 16"/>
+            <p:cNvSpPr txBox="1"/>
+            <p:nvPr/>
+          </p:nvSpPr>
+          <p:spPr>
+            <a:xfrm>
+              <a:off x="2187591" y="807395"/>
+              <a:ext cx="740908" cy="215444"/>
+            </a:xfrm>
+            <a:prstGeom prst="rect">
+              <a:avLst/>
+            </a:prstGeom>
+            <a:noFill/>
+          </p:spPr>
+          <p:txBody>
+            <a:bodyPr wrap="none" rtlCol="0">
+              <a:spAutoFit/>
+            </a:bodyPr>
+            <a:lstStyle/>
+            <a:p>
+              <a:r>
+                <a:rPr lang="en-US" sz="800" smtClean="0"/>
+                <a:t>If action exist</a:t>
+              </a:r>
+              <a:endParaRPr lang="en-US" sz="800"/>
+            </a:p>
+          </p:txBody>
+        </p:sp>
+        <p:sp>
+          <p:nvSpPr>
+            <p:cNvPr id="18" name="Rounded Rectangle 17"/>
+            <p:cNvSpPr/>
+            <p:nvPr/>
+          </p:nvSpPr>
+          <p:spPr>
+            <a:xfrm>
+              <a:off x="5328437" y="1776047"/>
+              <a:ext cx="1673471" cy="322384"/>
+            </a:xfrm>
+            <a:prstGeom prst="roundRect">
+              <a:avLst/>
+            </a:prstGeom>
+            <a:solidFill>
+              <a:schemeClr val="accent4">
+                <a:lumMod val="60000"/>
+                <a:lumOff val="40000"/>
+              </a:schemeClr>
+            </a:solidFill>
+            <a:ln>
+              <a:noFill/>
+            </a:ln>
+          </p:spPr>
+          <p:style>
+            <a:lnRef idx="2">
+              <a:schemeClr val="accent4">
+                <a:shade val="50000"/>
+              </a:schemeClr>
+            </a:lnRef>
+            <a:fillRef idx="1">
+              <a:schemeClr val="accent4"/>
+            </a:fillRef>
+            <a:effectRef idx="0">
+              <a:schemeClr val="accent4"/>
+            </a:effectRef>
+            <a:fontRef idx="minor">
+              <a:schemeClr val="lt1"/>
+            </a:fontRef>
+          </p:style>
+          <p:txBody>
+            <a:bodyPr rtlCol="0" anchor="ctr"/>
+            <a:lstStyle/>
+            <a:p>
+              <a:pPr algn="ctr"/>
+              <a:r>
+                <a:rPr lang="en-US" sz="1200" smtClean="0">
+                  <a:solidFill>
+                    <a:schemeClr val="tx1"/>
+                  </a:solidFill>
+                </a:rPr>
+                <a:t>IActionBuilder</a:t>
+              </a:r>
+            </a:p>
+          </p:txBody>
+        </p:sp>
+        <p:sp>
+          <p:nvSpPr>
+            <p:cNvPr id="19" name="TextBox 18"/>
+            <p:cNvSpPr txBox="1"/>
+            <p:nvPr/>
+          </p:nvSpPr>
+          <p:spPr>
+            <a:xfrm>
+              <a:off x="4581822" y="1717770"/>
+              <a:ext cx="742511" cy="215444"/>
+            </a:xfrm>
+            <a:prstGeom prst="rect">
+              <a:avLst/>
+            </a:prstGeom>
+            <a:noFill/>
+          </p:spPr>
+          <p:txBody>
+            <a:bodyPr wrap="none" rtlCol="0">
+              <a:spAutoFit/>
+            </a:bodyPr>
+            <a:lstStyle/>
+            <a:p>
+              <a:r>
+                <a:rPr lang="en-US" sz="800" smtClean="0"/>
+                <a:t>Create action</a:t>
+              </a:r>
+              <a:endParaRPr lang="en-US" sz="800"/>
+            </a:p>
+          </p:txBody>
+        </p:sp>
+        <p:cxnSp>
+          <p:nvCxnSpPr>
+            <p:cNvPr id="23" name="Straight Arrow Connector 22"/>
+            <p:cNvCxnSpPr>
+              <a:endCxn id="18" idx="1"/>
+            </p:cNvCxnSpPr>
+            <p:nvPr/>
+          </p:nvCxnSpPr>
+          <p:spPr>
+            <a:xfrm>
+              <a:off x="4624755" y="1933214"/>
+              <a:ext cx="703682" cy="4025"/>
+            </a:xfrm>
+            <a:prstGeom prst="straightConnector1">
+              <a:avLst/>
+            </a:prstGeom>
+            <a:ln>
+              <a:tailEnd type="triangle"/>
+            </a:ln>
+          </p:spPr>
+          <p:style>
+            <a:lnRef idx="1">
+              <a:schemeClr val="dk1"/>
+            </a:lnRef>
+            <a:fillRef idx="0">
+              <a:schemeClr val="dk1"/>
+            </a:fillRef>
+            <a:effectRef idx="0">
+              <a:schemeClr val="dk1"/>
+            </a:effectRef>
+            <a:fontRef idx="minor">
+              <a:schemeClr val="tx1"/>
+            </a:fontRef>
+          </p:style>
+        </p:cxnSp>
+        <p:sp>
+          <p:nvSpPr>
+            <p:cNvPr id="24" name="Rounded Rectangle 23"/>
+            <p:cNvSpPr/>
+            <p:nvPr/>
+          </p:nvSpPr>
+          <p:spPr>
+            <a:xfrm>
+              <a:off x="7828383" y="1776047"/>
+              <a:ext cx="1673471" cy="322384"/>
+            </a:xfrm>
+            <a:prstGeom prst="roundRect">
+              <a:avLst/>
+            </a:prstGeom>
+            <a:solidFill>
+              <a:schemeClr val="accent4">
+                <a:lumMod val="60000"/>
+                <a:lumOff val="40000"/>
+              </a:schemeClr>
+            </a:solidFill>
+            <a:ln>
+              <a:noFill/>
+            </a:ln>
+          </p:spPr>
+          <p:style>
+            <a:lnRef idx="2">
+              <a:schemeClr val="accent4">
+                <a:shade val="50000"/>
+              </a:schemeClr>
+            </a:lnRef>
+            <a:fillRef idx="1">
+              <a:schemeClr val="accent4"/>
+            </a:fillRef>
+            <a:effectRef idx="0">
+              <a:schemeClr val="accent4"/>
+            </a:effectRef>
+            <a:fontRef idx="minor">
+              <a:schemeClr val="lt1"/>
+            </a:fontRef>
+          </p:style>
+          <p:txBody>
+            <a:bodyPr rtlCol="0" anchor="ctr"/>
+            <a:lstStyle/>
+            <a:p>
+              <a:pPr algn="ctr"/>
+              <a:r>
+                <a:rPr lang="en-US" sz="1200" smtClean="0">
+                  <a:solidFill>
+                    <a:schemeClr val="tx1"/>
+                  </a:solidFill>
+                </a:rPr>
+                <a:t>IAction</a:t>
+              </a:r>
+            </a:p>
+          </p:txBody>
+        </p:sp>
+        <p:sp>
+          <p:nvSpPr>
+            <p:cNvPr id="25" name="TextBox 24"/>
+            <p:cNvSpPr txBox="1"/>
+            <p:nvPr/>
+          </p:nvSpPr>
+          <p:spPr>
+            <a:xfrm>
+              <a:off x="7043890" y="1717770"/>
+              <a:ext cx="679994" cy="215444"/>
+            </a:xfrm>
+            <a:prstGeom prst="rect">
+              <a:avLst/>
+            </a:prstGeom>
+            <a:noFill/>
+          </p:spPr>
+          <p:txBody>
+            <a:bodyPr wrap="none" rtlCol="0">
+              <a:spAutoFit/>
+            </a:bodyPr>
+            <a:lstStyle/>
+            <a:p>
+              <a:r>
+                <a:rPr lang="en-US" sz="800" smtClean="0"/>
+                <a:t>Build action</a:t>
+              </a:r>
+              <a:endParaRPr lang="en-US" sz="800"/>
+            </a:p>
+          </p:txBody>
+        </p:sp>
+        <p:cxnSp>
+          <p:nvCxnSpPr>
+            <p:cNvPr id="26" name="Straight Arrow Connector 25"/>
+            <p:cNvCxnSpPr>
+              <a:endCxn id="24" idx="1"/>
+            </p:cNvCxnSpPr>
+            <p:nvPr/>
+          </p:nvCxnSpPr>
+          <p:spPr>
+            <a:xfrm>
+              <a:off x="7001527" y="1927055"/>
+              <a:ext cx="826856" cy="10184"/>
+            </a:xfrm>
+            <a:prstGeom prst="straightConnector1">
+              <a:avLst/>
+            </a:prstGeom>
+            <a:ln>
+              <a:tailEnd type="triangle"/>
+            </a:ln>
+          </p:spPr>
+          <p:style>
+            <a:lnRef idx="1">
+              <a:schemeClr val="dk1"/>
+            </a:lnRef>
+            <a:fillRef idx="0">
+              <a:schemeClr val="dk1"/>
+            </a:fillRef>
+            <a:effectRef idx="0">
+              <a:schemeClr val="dk1"/>
+            </a:effectRef>
+            <a:fontRef idx="minor">
+              <a:schemeClr val="tx1"/>
+            </a:fontRef>
+          </p:style>
+        </p:cxnSp>
+      </p:grpSp>
+      <p:sp>
+        <p:nvSpPr>
+          <p:cNvPr id="29" name="Rounded Rectangle 28"/>
+          <p:cNvSpPr/>
+          <p:nvPr/>
+        </p:nvSpPr>
+        <p:spPr>
+          <a:xfrm>
+            <a:off x="126607" y="2694550"/>
+            <a:ext cx="1885073" cy="322384"/>
+          </a:xfrm>
+          <a:prstGeom prst="roundRect">
+            <a:avLst/>
+          </a:prstGeom>
+          <a:solidFill>
+            <a:schemeClr val="accent1">
+              <a:lumMod val="60000"/>
+              <a:lumOff val="40000"/>
+            </a:schemeClr>
+          </a:solidFill>
+          <a:ln>
+            <a:noFill/>
+          </a:ln>
+        </p:spPr>
+        <p:style>
+          <a:lnRef idx="2">
+            <a:schemeClr val="accent4">
+              <a:shade val="50000"/>
+            </a:schemeClr>
+          </a:lnRef>
+          <a:fillRef idx="1">
+            <a:schemeClr val="accent4"/>
+          </a:fillRef>
+          <a:effectRef idx="0">
+            <a:schemeClr val="accent4"/>
+          </a:effectRef>
+          <a:fontRef idx="minor">
+            <a:schemeClr val="lt1"/>
+          </a:fontRef>
+        </p:style>
+        <p:txBody>
+          <a:bodyPr rtlCol="0" anchor="ctr"/>
+          <a:lstStyle/>
+          <a:p>
+            <a:pPr algn="ctr"/>
+            <a:r>
+              <a:rPr lang="en-US" sz="1200" smtClean="0">
+                <a:solidFill>
+                  <a:schemeClr val="tx1"/>
+                </a:solidFill>
+              </a:rPr>
+              <a:t>CommandExecuterModel</a:t>
+            </a:r>
+          </a:p>
+        </p:txBody>
+      </p:sp>
+      <p:cxnSp>
+        <p:nvCxnSpPr>
+          <p:cNvPr id="31" name="Elbow Connector 30"/>
+          <p:cNvCxnSpPr>
+            <a:stCxn id="29" idx="0"/>
+            <a:endCxn id="3" idx="1"/>
+          </p:cNvCxnSpPr>
+          <p:nvPr/>
+        </p:nvCxnSpPr>
+        <p:spPr>
+          <a:xfrm rot="5400000" flipH="1" flipV="1">
+            <a:off x="1126000" y="1179930"/>
+            <a:ext cx="1457765" cy="1571477"/>
+          </a:xfrm>
+          <a:prstGeom prst="bentConnector2">
+            <a:avLst/>
+          </a:prstGeom>
+          <a:ln>
+            <a:tailEnd type="triangle"/>
+          </a:ln>
+        </p:spPr>
+        <p:style>
+          <a:lnRef idx="1">
+            <a:schemeClr val="dk1"/>
+          </a:lnRef>
+          <a:fillRef idx="0">
+            <a:schemeClr val="dk1"/>
+          </a:fillRef>
+          <a:effectRef idx="0">
+            <a:schemeClr val="dk1"/>
+          </a:effectRef>
+          <a:fontRef idx="minor">
+            <a:schemeClr val="tx1"/>
+          </a:fontRef>
+        </p:style>
+      </p:cxnSp>
+      <p:sp>
+        <p:nvSpPr>
+          <p:cNvPr id="32" name="TextBox 31"/>
+          <p:cNvSpPr txBox="1"/>
+          <p:nvPr/>
+        </p:nvSpPr>
+        <p:spPr>
+          <a:xfrm>
+            <a:off x="1481285" y="1075593"/>
+            <a:ext cx="615874" cy="215444"/>
+          </a:xfrm>
+          <a:prstGeom prst="rect">
+            <a:avLst/>
+          </a:prstGeom>
+          <a:noFill/>
+        </p:spPr>
+        <p:txBody>
+          <a:bodyPr wrap="none" rtlCol="0">
+            <a:spAutoFit/>
+          </a:bodyPr>
+          <a:lstStyle/>
+          <a:p>
+            <a:r>
+              <a:rPr lang="en-US" sz="800" smtClean="0"/>
+              <a:t>Get action</a:t>
+            </a:r>
+            <a:endParaRPr lang="en-US" sz="800"/>
+          </a:p>
+        </p:txBody>
+      </p:sp>
+      <p:sp>
+        <p:nvSpPr>
+          <p:cNvPr id="33" name="Rounded Rectangle 32"/>
+          <p:cNvSpPr/>
+          <p:nvPr/>
+        </p:nvSpPr>
+        <p:spPr>
+          <a:xfrm>
+            <a:off x="3347433" y="2697319"/>
+            <a:ext cx="1673471" cy="322384"/>
+          </a:xfrm>
+          <a:prstGeom prst="roundRect">
+            <a:avLst/>
+          </a:prstGeom>
+          <a:solidFill>
+            <a:schemeClr val="accent4">
+              <a:lumMod val="60000"/>
+              <a:lumOff val="40000"/>
+            </a:schemeClr>
+          </a:solidFill>
+          <a:ln>
+            <a:noFill/>
+          </a:ln>
+        </p:spPr>
+        <p:style>
+          <a:lnRef idx="2">
+            <a:schemeClr val="accent4">
+              <a:shade val="50000"/>
+            </a:schemeClr>
+          </a:lnRef>
+          <a:fillRef idx="1">
+            <a:schemeClr val="accent4"/>
+          </a:fillRef>
+          <a:effectRef idx="0">
+            <a:schemeClr val="accent4"/>
+          </a:effectRef>
+          <a:fontRef idx="minor">
+            <a:schemeClr val="lt1"/>
+          </a:fontRef>
+        </p:style>
+        <p:txBody>
+          <a:bodyPr rtlCol="0" anchor="ctr"/>
+          <a:lstStyle/>
+          <a:p>
+            <a:pPr algn="ctr"/>
+            <a:r>
+              <a:rPr lang="en-US" sz="1200" smtClean="0">
+                <a:solidFill>
+                  <a:schemeClr val="tx1"/>
+                </a:solidFill>
+              </a:rPr>
+              <a:t>IActionExecuteHelper</a:t>
+            </a:r>
+          </a:p>
+        </p:txBody>
+      </p:sp>
+      <p:cxnSp>
+        <p:nvCxnSpPr>
+          <p:cNvPr id="35" name="Straight Arrow Connector 34"/>
+          <p:cNvCxnSpPr>
+            <a:stCxn id="29" idx="3"/>
+            <a:endCxn id="33" idx="1"/>
+          </p:cNvCxnSpPr>
+          <p:nvPr/>
+        </p:nvCxnSpPr>
+        <p:spPr>
+          <a:xfrm>
+            <a:off x="2011680" y="2855742"/>
+            <a:ext cx="1335753" cy="2769"/>
+          </a:xfrm>
+          <a:prstGeom prst="straightConnector1">
+            <a:avLst/>
+          </a:prstGeom>
+          <a:ln>
+            <a:tailEnd type="triangle"/>
+          </a:ln>
+        </p:spPr>
+        <p:style>
+          <a:lnRef idx="1">
+            <a:schemeClr val="dk1"/>
+          </a:lnRef>
+          <a:fillRef idx="0">
+            <a:schemeClr val="dk1"/>
+          </a:fillRef>
+          <a:effectRef idx="0">
+            <a:schemeClr val="dk1"/>
+          </a:effectRef>
+          <a:fontRef idx="minor">
+            <a:schemeClr val="tx1"/>
+          </a:fontRef>
+        </p:style>
+      </p:cxnSp>
+      <p:sp>
+        <p:nvSpPr>
+          <p:cNvPr id="36" name="TextBox 35"/>
+          <p:cNvSpPr txBox="1"/>
+          <p:nvPr/>
+        </p:nvSpPr>
+        <p:spPr>
+          <a:xfrm>
+            <a:off x="2198616" y="2667425"/>
+            <a:ext cx="795411" cy="215444"/>
+          </a:xfrm>
+          <a:prstGeom prst="rect">
+            <a:avLst/>
+          </a:prstGeom>
+          <a:noFill/>
+        </p:spPr>
+        <p:txBody>
+          <a:bodyPr wrap="none" rtlCol="0">
+            <a:spAutoFit/>
+          </a:bodyPr>
+          <a:lstStyle/>
+          <a:p>
+            <a:r>
+              <a:rPr lang="en-US" sz="800" smtClean="0"/>
+              <a:t>Execute action</a:t>
+            </a:r>
+            <a:endParaRPr lang="en-US" sz="800"/>
+          </a:p>
+        </p:txBody>
+      </p:sp>
+      <p:sp>
+        <p:nvSpPr>
+          <p:cNvPr id="38" name="Rounded Rectangle 37"/>
+          <p:cNvSpPr/>
+          <p:nvPr/>
+        </p:nvSpPr>
+        <p:spPr>
+          <a:xfrm>
+            <a:off x="6047061" y="2694550"/>
+            <a:ext cx="1673471" cy="322384"/>
+          </a:xfrm>
+          <a:prstGeom prst="roundRect">
+            <a:avLst/>
+          </a:prstGeom>
+          <a:solidFill>
+            <a:schemeClr val="accent4">
+              <a:lumMod val="60000"/>
+              <a:lumOff val="40000"/>
+            </a:schemeClr>
+          </a:solidFill>
+          <a:ln>
+            <a:noFill/>
+          </a:ln>
+        </p:spPr>
+        <p:style>
+          <a:lnRef idx="2">
+            <a:schemeClr val="accent4">
+              <a:shade val="50000"/>
+            </a:schemeClr>
+          </a:lnRef>
+          <a:fillRef idx="1">
+            <a:schemeClr val="accent4"/>
+          </a:fillRef>
+          <a:effectRef idx="0">
+            <a:schemeClr val="accent4"/>
+          </a:effectRef>
+          <a:fontRef idx="minor">
+            <a:schemeClr val="lt1"/>
+          </a:fontRef>
+        </p:style>
+        <p:txBody>
+          <a:bodyPr rtlCol="0" anchor="ctr"/>
+          <a:lstStyle/>
+          <a:p>
+            <a:pPr algn="ctr"/>
+            <a:r>
+              <a:rPr lang="en-US" sz="1200" smtClean="0">
+                <a:solidFill>
+                  <a:schemeClr val="tx1"/>
+                </a:solidFill>
+              </a:rPr>
+              <a:t>IAction</a:t>
+            </a:r>
+          </a:p>
+        </p:txBody>
+      </p:sp>
+      <p:cxnSp>
+        <p:nvCxnSpPr>
+          <p:cNvPr id="39" name="Straight Arrow Connector 38"/>
+          <p:cNvCxnSpPr>
+            <a:endCxn id="38" idx="1"/>
+          </p:cNvCxnSpPr>
+          <p:nvPr/>
+        </p:nvCxnSpPr>
+        <p:spPr>
+          <a:xfrm>
+            <a:off x="5020904" y="2855742"/>
+            <a:ext cx="1026157" cy="0"/>
+          </a:xfrm>
+          <a:prstGeom prst="straightConnector1">
+            <a:avLst/>
+          </a:prstGeom>
+          <a:ln>
+            <a:tailEnd type="triangle"/>
+          </a:ln>
+        </p:spPr>
+        <p:style>
+          <a:lnRef idx="1">
+            <a:schemeClr val="dk1"/>
+          </a:lnRef>
+          <a:fillRef idx="0">
+            <a:schemeClr val="dk1"/>
+          </a:fillRef>
+          <a:effectRef idx="0">
+            <a:schemeClr val="dk1"/>
+          </a:effectRef>
+          <a:fontRef idx="minor">
+            <a:schemeClr val="tx1"/>
+          </a:fontRef>
+        </p:style>
+      </p:cxnSp>
+      <p:sp>
+        <p:nvSpPr>
+          <p:cNvPr id="40" name="TextBox 39"/>
+          <p:cNvSpPr txBox="1"/>
+          <p:nvPr/>
+        </p:nvSpPr>
+        <p:spPr>
+          <a:xfrm>
+            <a:off x="5207840" y="2667425"/>
+            <a:ext cx="513282" cy="215444"/>
+          </a:xfrm>
+          <a:prstGeom prst="rect">
+            <a:avLst/>
+          </a:prstGeom>
+          <a:noFill/>
+        </p:spPr>
+        <p:txBody>
+          <a:bodyPr wrap="none" rtlCol="0">
+            <a:spAutoFit/>
+          </a:bodyPr>
+          <a:lstStyle/>
+          <a:p>
+            <a:r>
+              <a:rPr lang="en-US" sz="800" smtClean="0"/>
+              <a:t>Execute</a:t>
+            </a:r>
+            <a:endParaRPr lang="en-US" sz="800"/>
+          </a:p>
+        </p:txBody>
+      </p:sp>
+    </p:spTree>
+    <p:extLst>
+      <p:ext uri="{BB962C8B-B14F-4D97-AF65-F5344CB8AC3E}">
+        <p14:creationId xmlns:p14="http://schemas.microsoft.com/office/powerpoint/2010/main" val="277532367"/>
+      </p:ext>
+    </p:extLst>
+  </p:cSld>
+  <p:clrMapOvr>
+    <a:masterClrMapping/>
+  </p:clrMapOvr>
+</p:sld>
+</file>
+
 <file path=ppt/theme/theme1.xml><?xml version="1.0" encoding="utf-8"?>
 <a:theme xmlns:a="http://schemas.openxmlformats.org/drawingml/2006/main" name="Office Theme">
   <a:themeElements>

</xml_diff>